<commit_message>
Updates to Powerpoint of STAT 601 Project 3 to add a sources page.
</commit_message>
<xml_diff>
--- a/R/STAT 601 - Applied Statistics I/Project 3 - Variance Analysis Aspirins/Project_3_Powerpoint_Gavin_Gunawardena.pptx
+++ b/R/STAT 601 - Applied Statistics I/Project 3 - Variance Analysis Aspirins/Project_3_Powerpoint_Gavin_Gunawardena.pptx
@@ -5,7 +5,7 @@
     <p:sldMasterId id="2147483696" r:id="rId4"/>
   </p:sldMasterIdLst>
   <p:notesMasterIdLst>
-    <p:notesMasterId r:id="rId21"/>
+    <p:notesMasterId r:id="rId22"/>
   </p:notesMasterIdLst>
   <p:sldIdLst>
     <p:sldId id="306" r:id="rId5"/>
@@ -24,6 +24,7 @@
     <p:sldId id="334" r:id="rId18"/>
     <p:sldId id="317" r:id="rId19"/>
     <p:sldId id="318" r:id="rId20"/>
+    <p:sldId id="335" r:id="rId21"/>
   </p:sldIdLst>
   <p:sldSz cx="12192000" cy="6858000"/>
   <p:notesSz cx="6858000" cy="9144000"/>
@@ -234,7 +235,7 @@
           <a:p>
             <a:fld id="{5EA28068-AFBD-4979-B752-9EB6F90B1386}" type="datetimeFigureOut">
               <a:rPr lang="en-US" smtClean="0"/>
-              <a:t>8/8/2022</a:t>
+              <a:t>8/9/2022</a:t>
             </a:fld>
             <a:endParaRPr lang="en-US" dirty="0"/>
           </a:p>
@@ -13750,15 +13751,7 @@
             </a:r>
             <a:r>
               <a:rPr lang="en-US" sz="2000" dirty="0"/>
-              <a:t> brand aspirin pills are found to be different at a 95% </a:t>
-            </a:r>
-            <a:r>
-              <a:rPr lang="en-US" sz="2000"/>
-              <a:t>confidence interval, </a:t>
-            </a:r>
-            <a:r>
-              <a:rPr lang="en-US" sz="2000" dirty="0"/>
-              <a:t>rejecting the null hypothesis</a:t>
+              <a:t> brand aspirin pills are found to be different at a 95% confidence interval, rejecting the null hypothesis</a:t>
             </a:r>
           </a:p>
           <a:p>
@@ -13773,6 +13766,155 @@
     <p:extLst>
       <p:ext uri="{BB962C8B-B14F-4D97-AF65-F5344CB8AC3E}">
         <p14:creationId xmlns:p14="http://schemas.microsoft.com/office/powerpoint/2010/main" val="4050007183"/>
+      </p:ext>
+    </p:extLst>
+  </p:cSld>
+  <p:clrMapOvr>
+    <a:masterClrMapping/>
+  </p:clrMapOvr>
+</p:sld>
+</file>
+
+<file path=ppt/slides/slide17.xml><?xml version="1.0" encoding="utf-8"?>
+<p:sld xmlns:a="http://schemas.openxmlformats.org/drawingml/2006/main" xmlns:r="http://schemas.openxmlformats.org/officeDocument/2006/relationships" xmlns:p="http://schemas.openxmlformats.org/presentationml/2006/main">
+  <p:cSld>
+    <p:spTree>
+      <p:nvGrpSpPr>
+        <p:cNvPr id="1" name=""/>
+        <p:cNvGrpSpPr/>
+        <p:nvPr/>
+      </p:nvGrpSpPr>
+      <p:grpSpPr>
+        <a:xfrm>
+          <a:off x="0" y="0"/>
+          <a:ext cx="0" cy="0"/>
+          <a:chOff x="0" y="0"/>
+          <a:chExt cx="0" cy="0"/>
+        </a:xfrm>
+      </p:grpSpPr>
+      <p:sp>
+        <p:nvSpPr>
+          <p:cNvPr id="2" name="Title 1">
+            <a:extLst>
+              <a:ext uri="{FF2B5EF4-FFF2-40B4-BE49-F238E27FC236}">
+                <a16:creationId xmlns:a16="http://schemas.microsoft.com/office/drawing/2014/main" id="{CFACDA59-55A0-4EA5-B3E4-646D1D3B4CEB}"/>
+              </a:ext>
+            </a:extLst>
+          </p:cNvPr>
+          <p:cNvSpPr>
+            <a:spLocks noGrp="1"/>
+          </p:cNvSpPr>
+          <p:nvPr>
+            <p:ph type="title"/>
+          </p:nvPr>
+        </p:nvSpPr>
+        <p:spPr/>
+        <p:txBody>
+          <a:bodyPr>
+            <a:normAutofit/>
+          </a:bodyPr>
+          <a:lstStyle/>
+          <a:p>
+            <a:r>
+              <a:rPr lang="en-US" sz="5400" dirty="0"/>
+              <a:t>Sources</a:t>
+            </a:r>
+          </a:p>
+        </p:txBody>
+      </p:sp>
+      <p:sp>
+        <p:nvSpPr>
+          <p:cNvPr id="4" name="Content Placeholder 3">
+            <a:extLst>
+              <a:ext uri="{FF2B5EF4-FFF2-40B4-BE49-F238E27FC236}">
+                <a16:creationId xmlns:a16="http://schemas.microsoft.com/office/drawing/2014/main" id="{1FE9CB6C-6FF8-4B8C-9B41-2DDD39B25DE3}"/>
+              </a:ext>
+            </a:extLst>
+          </p:cNvPr>
+          <p:cNvSpPr>
+            <a:spLocks noGrp="1"/>
+          </p:cNvSpPr>
+          <p:nvPr>
+            <p:ph sz="half" idx="2"/>
+          </p:nvPr>
+        </p:nvSpPr>
+        <p:spPr>
+          <a:xfrm>
+            <a:off x="1447800" y="2081306"/>
+            <a:ext cx="9904412" cy="2828046"/>
+          </a:xfrm>
+        </p:spPr>
+        <p:txBody>
+          <a:bodyPr>
+            <a:normAutofit/>
+          </a:bodyPr>
+          <a:lstStyle/>
+          <a:p>
+            <a:r>
+              <a:rPr lang="en-US" sz="2400" dirty="0">
+                <a:latin typeface="Cambria" panose="02040503050406030204" pitchFamily="18" charset="0"/>
+                <a:ea typeface="Cambria" panose="02040503050406030204" pitchFamily="18" charset="0"/>
+                <a:cs typeface="Times New Roman" panose="02020603050405020304" pitchFamily="18" charset="0"/>
+              </a:rPr>
+              <a:t>https://www.vedantu.com/formula/anova-formula</a:t>
+            </a:r>
+          </a:p>
+          <a:p>
+            <a:r>
+              <a:rPr lang="en-US" sz="2400" dirty="0">
+                <a:latin typeface="Cambria" panose="02040503050406030204" pitchFamily="18" charset="0"/>
+                <a:ea typeface="Cambria" panose="02040503050406030204" pitchFamily="18" charset="0"/>
+                <a:cs typeface="Times New Roman" panose="02020603050405020304" pitchFamily="18" charset="0"/>
+              </a:rPr>
+              <a:t> https://www.educba.com/t-test-formula/</a:t>
+            </a:r>
+          </a:p>
+          <a:p>
+            <a:r>
+              <a:rPr lang="en-US" sz="2400" dirty="0">
+                <a:latin typeface="Cambria" panose="02040503050406030204" pitchFamily="18" charset="0"/>
+                <a:ea typeface="Cambria" panose="02040503050406030204" pitchFamily="18" charset="0"/>
+                <a:cs typeface="Times New Roman" panose="02020603050405020304" pitchFamily="18" charset="0"/>
+              </a:rPr>
+              <a:t>https://www.statology.org/tukey-vs-bonferroni-vs-scheffe/</a:t>
+            </a:r>
+          </a:p>
+          <a:p>
+            <a:r>
+              <a:rPr lang="en-US" sz="2400" dirty="0">
+                <a:latin typeface="Cambria" panose="02040503050406030204" pitchFamily="18" charset="0"/>
+                <a:ea typeface="Cambria" panose="02040503050406030204" pitchFamily="18" charset="0"/>
+                <a:cs typeface="Times New Roman" panose="02020603050405020304" pitchFamily="18" charset="0"/>
+              </a:rPr>
+              <a:t>https://aaronschlegel.me/tukeys-test-post-hoc-analysis.html</a:t>
+            </a:r>
+          </a:p>
+          <a:p>
+            <a:r>
+              <a:rPr lang="en-US" sz="2400" dirty="0">
+                <a:latin typeface="Cambria" panose="02040503050406030204" pitchFamily="18" charset="0"/>
+                <a:ea typeface="Cambria" panose="02040503050406030204" pitchFamily="18" charset="0"/>
+                <a:cs typeface="Times New Roman" panose="02020603050405020304" pitchFamily="18" charset="0"/>
+              </a:rPr>
+              <a:t>https://www.itl.nist.gov/div898/handbook/prc/section4/prc473.htm</a:t>
+            </a:r>
+          </a:p>
+          <a:p>
+            <a:r>
+              <a:rPr lang="en-US" sz="2400" dirty="0">
+                <a:latin typeface="Cambria" panose="02040503050406030204" pitchFamily="18" charset="0"/>
+                <a:ea typeface="Cambria" panose="02040503050406030204" pitchFamily="18" charset="0"/>
+                <a:cs typeface="Times New Roman" panose="02020603050405020304" pitchFamily="18" charset="0"/>
+              </a:rPr>
+              <a:t>https://www.ncbi.nlm.nih.gov/pmc/articles/PMC3052391/ </a:t>
+            </a:r>
+          </a:p>
+        </p:txBody>
+      </p:sp>
+    </p:spTree>
+    <p:extLst>
+      <p:ext uri="{BB962C8B-B14F-4D97-AF65-F5344CB8AC3E}">
+        <p14:creationId xmlns:p14="http://schemas.microsoft.com/office/powerpoint/2010/main" val="2816774133"/>
       </p:ext>
     </p:extLst>
   </p:cSld>
@@ -15865,24 +16007,6 @@
 </file>
 
 <file path=customXml/item1.xml><?xml version="1.0" encoding="utf-8"?>
-<p:properties xmlns:p="http://schemas.microsoft.com/office/2006/metadata/properties" xmlns:xsi="http://www.w3.org/2001/XMLSchema-instance" xmlns:pc="http://schemas.microsoft.com/office/infopath/2007/PartnerControls">
-  <documentManagement>
-    <Status xmlns="71af3243-3dd4-4a8d-8c0d-dd76da1f02a5">Not started</Status>
-    <MediaServiceKeyPoints xmlns="71af3243-3dd4-4a8d-8c0d-dd76da1f02a5" xsi:nil="true"/>
-  </documentManagement>
-</p:properties>
-</file>
-
-<file path=customXml/item2.xml><?xml version="1.0" encoding="utf-8"?>
-<?mso-contentType ?>
-<FormTemplates xmlns="http://schemas.microsoft.com/sharepoint/v3/contenttype/forms">
-  <Display>DocumentLibraryForm</Display>
-  <Edit>DocumentLibraryForm</Edit>
-  <New>DocumentLibraryForm</New>
-</FormTemplates>
-</file>
-
-<file path=customXml/item3.xml><?xml version="1.0" encoding="utf-8"?>
 <ct:contentTypeSchema xmlns:ct="http://schemas.microsoft.com/office/2006/metadata/contentType" xmlns:ma="http://schemas.microsoft.com/office/2006/metadata/properties/metaAttributes" ct:_="" ma:_="" ma:contentTypeName="Document" ma:contentTypeID="0x01010079F111ED35F8CC479449609E8A0923A6" ma:contentTypeVersion="12" ma:contentTypeDescription="Create a new document." ma:contentTypeScope="" ma:versionID="426e97fa315356fffbdcd9876fe988c2">
   <xsd:schema xmlns:xsd="http://www.w3.org/2001/XMLSchema" xmlns:xs="http://www.w3.org/2001/XMLSchema" xmlns:p="http://schemas.microsoft.com/office/2006/metadata/properties" xmlns:ns2="71af3243-3dd4-4a8d-8c0d-dd76da1f02a5" xmlns:ns3="16c05727-aa75-4e4a-9b5f-8a80a1165891" targetNamespace="http://schemas.microsoft.com/office/2006/metadata/properties" ma:root="true" ma:fieldsID="14b8f0def80e6d70ce3def20c90759ae" ns2:_="" ns3:_="">
     <xsd:import namespace="71af3243-3dd4-4a8d-8c0d-dd76da1f02a5"/>
@@ -16103,25 +16227,25 @@
 </ct:contentTypeSchema>
 </file>
 
-<file path=customXml/itemProps1.xml><?xml version="1.0" encoding="utf-8"?>
-<ds:datastoreItem xmlns:ds="http://schemas.openxmlformats.org/officeDocument/2006/customXml" ds:itemID="{99919F73-B6C2-4A43-95E2-833EC48925FE}">
-  <ds:schemaRefs>
-    <ds:schemaRef ds:uri="http://schemas.microsoft.com/office/2006/metadata/properties"/>
-    <ds:schemaRef ds:uri="http://schemas.microsoft.com/office/infopath/2007/PartnerControls"/>
-    <ds:schemaRef ds:uri="71af3243-3dd4-4a8d-8c0d-dd76da1f02a5"/>
-  </ds:schemaRefs>
-</ds:datastoreItem>
+<file path=customXml/item2.xml><?xml version="1.0" encoding="utf-8"?>
+<?mso-contentType ?>
+<FormTemplates xmlns="http://schemas.microsoft.com/sharepoint/v3/contenttype/forms">
+  <Display>DocumentLibraryForm</Display>
+  <Edit>DocumentLibraryForm</Edit>
+  <New>DocumentLibraryForm</New>
+</FormTemplates>
 </file>
 
-<file path=customXml/itemProps2.xml><?xml version="1.0" encoding="utf-8"?>
-<ds:datastoreItem xmlns:ds="http://schemas.openxmlformats.org/officeDocument/2006/customXml" ds:itemID="{3C8E00D1-8EA3-4E42-801D-0253E1EAFC21}">
-  <ds:schemaRefs>
-    <ds:schemaRef ds:uri="http://schemas.microsoft.com/sharepoint/v3/contenttype/forms"/>
-  </ds:schemaRefs>
-</ds:datastoreItem>
+<file path=customXml/item3.xml><?xml version="1.0" encoding="utf-8"?>
+<p:properties xmlns:p="http://schemas.microsoft.com/office/2006/metadata/properties" xmlns:xsi="http://www.w3.org/2001/XMLSchema-instance" xmlns:pc="http://schemas.microsoft.com/office/infopath/2007/PartnerControls">
+  <documentManagement>
+    <Status xmlns="71af3243-3dd4-4a8d-8c0d-dd76da1f02a5">Not started</Status>
+    <MediaServiceKeyPoints xmlns="71af3243-3dd4-4a8d-8c0d-dd76da1f02a5" xsi:nil="true"/>
+  </documentManagement>
+</p:properties>
 </file>
 
-<file path=customXml/itemProps3.xml><?xml version="1.0" encoding="utf-8"?>
+<file path=customXml/itemProps1.xml><?xml version="1.0" encoding="utf-8"?>
 <ds:datastoreItem xmlns:ds="http://schemas.openxmlformats.org/officeDocument/2006/customXml" ds:itemID="{ABC329F5-30EE-4BF7-AA2A-B837B51416B4}">
   <ds:schemaRefs>
     <ds:schemaRef ds:uri="http://schemas.microsoft.com/office/2006/metadata/contentType"/>
@@ -16138,4 +16262,22 @@
     <ds:schemaRef ds:uri="http://schemas.microsoft.com/internal/obd"/>
   </ds:schemaRefs>
 </ds:datastoreItem>
+</file>
+
+<file path=customXml/itemProps2.xml><?xml version="1.0" encoding="utf-8"?>
+<ds:datastoreItem xmlns:ds="http://schemas.openxmlformats.org/officeDocument/2006/customXml" ds:itemID="{3C8E00D1-8EA3-4E42-801D-0253E1EAFC21}">
+  <ds:schemaRefs>
+    <ds:schemaRef ds:uri="http://schemas.microsoft.com/sharepoint/v3/contenttype/forms"/>
+  </ds:schemaRefs>
+</ds:datastoreItem>
+</file>
+
+<file path=customXml/itemProps3.xml><?xml version="1.0" encoding="utf-8"?>
+<ds:datastoreItem xmlns:ds="http://schemas.openxmlformats.org/officeDocument/2006/customXml" ds:itemID="{99919F73-B6C2-4A43-95E2-833EC48925FE}">
+  <ds:schemaRefs>
+    <ds:schemaRef ds:uri="http://schemas.microsoft.com/office/2006/metadata/properties"/>
+    <ds:schemaRef ds:uri="http://schemas.microsoft.com/office/infopath/2007/PartnerControls"/>
+    <ds:schemaRef ds:uri="71af3243-3dd4-4a8d-8c0d-dd76da1f02a5"/>
+  </ds:schemaRefs>
+</ds:datastoreItem>
 </file>
</xml_diff>

<commit_message>
Updated Aspirin ANOVA project to fix a typo.
</commit_message>
<xml_diff>
--- a/R/STAT 601 - Applied Statistics I/Project 3 - Variance Analysis Aspirins/Project_3_Powerpoint_Gavin_Gunawardena.pptx
+++ b/R/STAT 601 - Applied Statistics I/Project 3 - Variance Analysis Aspirins/Project_3_Powerpoint_Gavin_Gunawardena.pptx
@@ -235,7 +235,7 @@
           <a:p>
             <a:fld id="{5EA28068-AFBD-4979-B752-9EB6F90B1386}" type="datetimeFigureOut">
               <a:rPr lang="en-US" smtClean="0"/>
-              <a:t>8/9/2022</a:t>
+              <a:t>8/12/2022</a:t>
             </a:fld>
             <a:endParaRPr lang="en-US" dirty="0"/>
           </a:p>
@@ -14051,7 +14051,7 @@
             <a:pPr lvl="1"/>
             <a:r>
               <a:rPr lang="en-US" dirty="0"/>
-              <a:t>3 pills from 3 different brands of aspiring (Bayer, PV, and Walgreens)</a:t>
+              <a:t>3 pills from 3 different brands of aspirin (Bayer, PV, and Walgreens)</a:t>
             </a:r>
           </a:p>
           <a:p>
@@ -14077,21 +14077,21 @@
             </a:r>
           </a:p>
           <a:p>
-            <a:pPr lvl="1"/>
+            <a:pPr lvl="2"/>
             <a:r>
               <a:rPr lang="en-US" dirty="0"/>
               <a:t>Peak: time when the intensity of each pill is at its highest, usually when a chemical is released from the pill, usually at artificially timed intervals</a:t>
             </a:r>
           </a:p>
           <a:p>
-            <a:pPr lvl="1"/>
+            <a:pPr lvl="2"/>
             <a:r>
               <a:rPr lang="en-US" dirty="0"/>
               <a:t>Replicant: replicas of the same pill; 3 replicas of 3 different brands have been tested</a:t>
             </a:r>
           </a:p>
           <a:p>
-            <a:pPr lvl="1"/>
+            <a:pPr lvl="2"/>
             <a:r>
               <a:rPr lang="en-US" dirty="0"/>
               <a:t>Aliquots: Series of measurements within a timeframe of less than a second</a:t>
@@ -14226,7 +14226,7 @@
           <a:p>
             <a:r>
               <a:rPr lang="en-US" dirty="0"/>
-              <a:t>Objective is to test the null hypothesis that the 3 brands of aspiring are the same with a  95% confidence interval</a:t>
+              <a:t>Objective is to test the null hypothesis that the 3 brands of aspirin are the same with a  95% confidence interval</a:t>
             </a:r>
           </a:p>
           <a:p>
@@ -16007,6 +16007,24 @@
 </file>
 
 <file path=customXml/item1.xml><?xml version="1.0" encoding="utf-8"?>
+<p:properties xmlns:p="http://schemas.microsoft.com/office/2006/metadata/properties" xmlns:xsi="http://www.w3.org/2001/XMLSchema-instance" xmlns:pc="http://schemas.microsoft.com/office/infopath/2007/PartnerControls">
+  <documentManagement>
+    <Status xmlns="71af3243-3dd4-4a8d-8c0d-dd76da1f02a5">Not started</Status>
+    <MediaServiceKeyPoints xmlns="71af3243-3dd4-4a8d-8c0d-dd76da1f02a5" xsi:nil="true"/>
+  </documentManagement>
+</p:properties>
+</file>
+
+<file path=customXml/item2.xml><?xml version="1.0" encoding="utf-8"?>
+<?mso-contentType ?>
+<FormTemplates xmlns="http://schemas.microsoft.com/sharepoint/v3/contenttype/forms">
+  <Display>DocumentLibraryForm</Display>
+  <Edit>DocumentLibraryForm</Edit>
+  <New>DocumentLibraryForm</New>
+</FormTemplates>
+</file>
+
+<file path=customXml/item3.xml><?xml version="1.0" encoding="utf-8"?>
 <ct:contentTypeSchema xmlns:ct="http://schemas.microsoft.com/office/2006/metadata/contentType" xmlns:ma="http://schemas.microsoft.com/office/2006/metadata/properties/metaAttributes" ct:_="" ma:_="" ma:contentTypeName="Document" ma:contentTypeID="0x01010079F111ED35F8CC479449609E8A0923A6" ma:contentTypeVersion="12" ma:contentTypeDescription="Create a new document." ma:contentTypeScope="" ma:versionID="426e97fa315356fffbdcd9876fe988c2">
   <xsd:schema xmlns:xsd="http://www.w3.org/2001/XMLSchema" xmlns:xs="http://www.w3.org/2001/XMLSchema" xmlns:p="http://schemas.microsoft.com/office/2006/metadata/properties" xmlns:ns2="71af3243-3dd4-4a8d-8c0d-dd76da1f02a5" xmlns:ns3="16c05727-aa75-4e4a-9b5f-8a80a1165891" targetNamespace="http://schemas.microsoft.com/office/2006/metadata/properties" ma:root="true" ma:fieldsID="14b8f0def80e6d70ce3def20c90759ae" ns2:_="" ns3:_="">
     <xsd:import namespace="71af3243-3dd4-4a8d-8c0d-dd76da1f02a5"/>
@@ -16227,25 +16245,25 @@
 </ct:contentTypeSchema>
 </file>
 
-<file path=customXml/item2.xml><?xml version="1.0" encoding="utf-8"?>
-<?mso-contentType ?>
-<FormTemplates xmlns="http://schemas.microsoft.com/sharepoint/v3/contenttype/forms">
-  <Display>DocumentLibraryForm</Display>
-  <Edit>DocumentLibraryForm</Edit>
-  <New>DocumentLibraryForm</New>
-</FormTemplates>
+<file path=customXml/itemProps1.xml><?xml version="1.0" encoding="utf-8"?>
+<ds:datastoreItem xmlns:ds="http://schemas.openxmlformats.org/officeDocument/2006/customXml" ds:itemID="{99919F73-B6C2-4A43-95E2-833EC48925FE}">
+  <ds:schemaRefs>
+    <ds:schemaRef ds:uri="http://schemas.microsoft.com/office/2006/metadata/properties"/>
+    <ds:schemaRef ds:uri="http://schemas.microsoft.com/office/infopath/2007/PartnerControls"/>
+    <ds:schemaRef ds:uri="71af3243-3dd4-4a8d-8c0d-dd76da1f02a5"/>
+  </ds:schemaRefs>
+</ds:datastoreItem>
 </file>
 
-<file path=customXml/item3.xml><?xml version="1.0" encoding="utf-8"?>
-<p:properties xmlns:p="http://schemas.microsoft.com/office/2006/metadata/properties" xmlns:xsi="http://www.w3.org/2001/XMLSchema-instance" xmlns:pc="http://schemas.microsoft.com/office/infopath/2007/PartnerControls">
-  <documentManagement>
-    <Status xmlns="71af3243-3dd4-4a8d-8c0d-dd76da1f02a5">Not started</Status>
-    <MediaServiceKeyPoints xmlns="71af3243-3dd4-4a8d-8c0d-dd76da1f02a5" xsi:nil="true"/>
-  </documentManagement>
-</p:properties>
+<file path=customXml/itemProps2.xml><?xml version="1.0" encoding="utf-8"?>
+<ds:datastoreItem xmlns:ds="http://schemas.openxmlformats.org/officeDocument/2006/customXml" ds:itemID="{3C8E00D1-8EA3-4E42-801D-0253E1EAFC21}">
+  <ds:schemaRefs>
+    <ds:schemaRef ds:uri="http://schemas.microsoft.com/sharepoint/v3/contenttype/forms"/>
+  </ds:schemaRefs>
+</ds:datastoreItem>
 </file>
 
-<file path=customXml/itemProps1.xml><?xml version="1.0" encoding="utf-8"?>
+<file path=customXml/itemProps3.xml><?xml version="1.0" encoding="utf-8"?>
 <ds:datastoreItem xmlns:ds="http://schemas.openxmlformats.org/officeDocument/2006/customXml" ds:itemID="{ABC329F5-30EE-4BF7-AA2A-B837B51416B4}">
   <ds:schemaRefs>
     <ds:schemaRef ds:uri="http://schemas.microsoft.com/office/2006/metadata/contentType"/>
@@ -16262,22 +16280,4 @@
     <ds:schemaRef ds:uri="http://schemas.microsoft.com/internal/obd"/>
   </ds:schemaRefs>
 </ds:datastoreItem>
-</file>
-
-<file path=customXml/itemProps2.xml><?xml version="1.0" encoding="utf-8"?>
-<ds:datastoreItem xmlns:ds="http://schemas.openxmlformats.org/officeDocument/2006/customXml" ds:itemID="{3C8E00D1-8EA3-4E42-801D-0253E1EAFC21}">
-  <ds:schemaRefs>
-    <ds:schemaRef ds:uri="http://schemas.microsoft.com/sharepoint/v3/contenttype/forms"/>
-  </ds:schemaRefs>
-</ds:datastoreItem>
-</file>
-
-<file path=customXml/itemProps3.xml><?xml version="1.0" encoding="utf-8"?>
-<ds:datastoreItem xmlns:ds="http://schemas.openxmlformats.org/officeDocument/2006/customXml" ds:itemID="{99919F73-B6C2-4A43-95E2-833EC48925FE}">
-  <ds:schemaRefs>
-    <ds:schemaRef ds:uri="http://schemas.microsoft.com/office/2006/metadata/properties"/>
-    <ds:schemaRef ds:uri="http://schemas.microsoft.com/office/infopath/2007/PartnerControls"/>
-    <ds:schemaRef ds:uri="71af3243-3dd4-4a8d-8c0d-dd76da1f02a5"/>
-  </ds:schemaRefs>
-</ds:datastoreItem>
 </file>
</xml_diff>

<commit_message>
Updates to INFS  768 Patient classification project
</commit_message>
<xml_diff>
--- a/R/STAT 601 - Applied Statistics I/Project 3 - Variance Analysis Aspirins/Project_3_Powerpoint_Gavin_Gunawardena.pptx
+++ b/R/STAT 601 - Applied Statistics I/Project 3 - Variance Analysis Aspirins/Project_3_Powerpoint_Gavin_Gunawardena.pptx
@@ -235,7 +235,7 @@
           <a:p>
             <a:fld id="{5EA28068-AFBD-4979-B752-9EB6F90B1386}" type="datetimeFigureOut">
               <a:rPr lang="en-US" smtClean="0"/>
-              <a:t>8/12/2022</a:t>
+              <a:t>9/15/2022</a:t>
             </a:fld>
             <a:endParaRPr lang="en-US" dirty="0"/>
           </a:p>
@@ -14058,7 +14058,7 @@
             <a:pPr lvl="1"/>
             <a:r>
               <a:rPr lang="en-US" dirty="0"/>
-              <a:t>Dataset consists of 63 </a:t>
+              <a:t>63 </a:t>
             </a:r>
             <a:r>
               <a:rPr lang="en-US" dirty="0" err="1"/>
@@ -14073,14 +14073,14 @@
             <a:pPr lvl="1"/>
             <a:r>
               <a:rPr lang="en-US" dirty="0"/>
-              <a:t>There are 3 aliquots for each replicant, 3 replicants for each peak, and 7 peaks for each brand in the dataset</a:t>
+              <a:t>3 aliquots for each replicant, 3 replicants for each peak, and 7 peaks for each brand in the dataset</a:t>
             </a:r>
           </a:p>
           <a:p>
             <a:pPr lvl="2"/>
             <a:r>
               <a:rPr lang="en-US" dirty="0"/>
-              <a:t>Peak: time when the intensity of each pill is at its highest, usually when a chemical is released from the pill, usually at artificially timed intervals</a:t>
+              <a:t>Peak: time when the intensity of each pill is at its highest, usually when a chemical is released from the pill and at artificially timed intervals</a:t>
             </a:r>
           </a:p>
           <a:p>
@@ -16007,24 +16007,6 @@
 </file>
 
 <file path=customXml/item1.xml><?xml version="1.0" encoding="utf-8"?>
-<p:properties xmlns:p="http://schemas.microsoft.com/office/2006/metadata/properties" xmlns:xsi="http://www.w3.org/2001/XMLSchema-instance" xmlns:pc="http://schemas.microsoft.com/office/infopath/2007/PartnerControls">
-  <documentManagement>
-    <Status xmlns="71af3243-3dd4-4a8d-8c0d-dd76da1f02a5">Not started</Status>
-    <MediaServiceKeyPoints xmlns="71af3243-3dd4-4a8d-8c0d-dd76da1f02a5" xsi:nil="true"/>
-  </documentManagement>
-</p:properties>
-</file>
-
-<file path=customXml/item2.xml><?xml version="1.0" encoding="utf-8"?>
-<?mso-contentType ?>
-<FormTemplates xmlns="http://schemas.microsoft.com/sharepoint/v3/contenttype/forms">
-  <Display>DocumentLibraryForm</Display>
-  <Edit>DocumentLibraryForm</Edit>
-  <New>DocumentLibraryForm</New>
-</FormTemplates>
-</file>
-
-<file path=customXml/item3.xml><?xml version="1.0" encoding="utf-8"?>
 <ct:contentTypeSchema xmlns:ct="http://schemas.microsoft.com/office/2006/metadata/contentType" xmlns:ma="http://schemas.microsoft.com/office/2006/metadata/properties/metaAttributes" ct:_="" ma:_="" ma:contentTypeName="Document" ma:contentTypeID="0x01010079F111ED35F8CC479449609E8A0923A6" ma:contentTypeVersion="12" ma:contentTypeDescription="Create a new document." ma:contentTypeScope="" ma:versionID="426e97fa315356fffbdcd9876fe988c2">
   <xsd:schema xmlns:xsd="http://www.w3.org/2001/XMLSchema" xmlns:xs="http://www.w3.org/2001/XMLSchema" xmlns:p="http://schemas.microsoft.com/office/2006/metadata/properties" xmlns:ns2="71af3243-3dd4-4a8d-8c0d-dd76da1f02a5" xmlns:ns3="16c05727-aa75-4e4a-9b5f-8a80a1165891" targetNamespace="http://schemas.microsoft.com/office/2006/metadata/properties" ma:root="true" ma:fieldsID="14b8f0def80e6d70ce3def20c90759ae" ns2:_="" ns3:_="">
     <xsd:import namespace="71af3243-3dd4-4a8d-8c0d-dd76da1f02a5"/>
@@ -16245,25 +16227,25 @@
 </ct:contentTypeSchema>
 </file>
 
-<file path=customXml/itemProps1.xml><?xml version="1.0" encoding="utf-8"?>
-<ds:datastoreItem xmlns:ds="http://schemas.openxmlformats.org/officeDocument/2006/customXml" ds:itemID="{99919F73-B6C2-4A43-95E2-833EC48925FE}">
-  <ds:schemaRefs>
-    <ds:schemaRef ds:uri="http://schemas.microsoft.com/office/2006/metadata/properties"/>
-    <ds:schemaRef ds:uri="http://schemas.microsoft.com/office/infopath/2007/PartnerControls"/>
-    <ds:schemaRef ds:uri="71af3243-3dd4-4a8d-8c0d-dd76da1f02a5"/>
-  </ds:schemaRefs>
-</ds:datastoreItem>
+<file path=customXml/item2.xml><?xml version="1.0" encoding="utf-8"?>
+<?mso-contentType ?>
+<FormTemplates xmlns="http://schemas.microsoft.com/sharepoint/v3/contenttype/forms">
+  <Display>DocumentLibraryForm</Display>
+  <Edit>DocumentLibraryForm</Edit>
+  <New>DocumentLibraryForm</New>
+</FormTemplates>
 </file>
 
-<file path=customXml/itemProps2.xml><?xml version="1.0" encoding="utf-8"?>
-<ds:datastoreItem xmlns:ds="http://schemas.openxmlformats.org/officeDocument/2006/customXml" ds:itemID="{3C8E00D1-8EA3-4E42-801D-0253E1EAFC21}">
-  <ds:schemaRefs>
-    <ds:schemaRef ds:uri="http://schemas.microsoft.com/sharepoint/v3/contenttype/forms"/>
-  </ds:schemaRefs>
-</ds:datastoreItem>
+<file path=customXml/item3.xml><?xml version="1.0" encoding="utf-8"?>
+<p:properties xmlns:p="http://schemas.microsoft.com/office/2006/metadata/properties" xmlns:xsi="http://www.w3.org/2001/XMLSchema-instance" xmlns:pc="http://schemas.microsoft.com/office/infopath/2007/PartnerControls">
+  <documentManagement>
+    <Status xmlns="71af3243-3dd4-4a8d-8c0d-dd76da1f02a5">Not started</Status>
+    <MediaServiceKeyPoints xmlns="71af3243-3dd4-4a8d-8c0d-dd76da1f02a5" xsi:nil="true"/>
+  </documentManagement>
+</p:properties>
 </file>
 
-<file path=customXml/itemProps3.xml><?xml version="1.0" encoding="utf-8"?>
+<file path=customXml/itemProps1.xml><?xml version="1.0" encoding="utf-8"?>
 <ds:datastoreItem xmlns:ds="http://schemas.openxmlformats.org/officeDocument/2006/customXml" ds:itemID="{ABC329F5-30EE-4BF7-AA2A-B837B51416B4}">
   <ds:schemaRefs>
     <ds:schemaRef ds:uri="http://schemas.microsoft.com/office/2006/metadata/contentType"/>
@@ -16280,4 +16262,22 @@
     <ds:schemaRef ds:uri="http://schemas.microsoft.com/internal/obd"/>
   </ds:schemaRefs>
 </ds:datastoreItem>
+</file>
+
+<file path=customXml/itemProps2.xml><?xml version="1.0" encoding="utf-8"?>
+<ds:datastoreItem xmlns:ds="http://schemas.openxmlformats.org/officeDocument/2006/customXml" ds:itemID="{3C8E00D1-8EA3-4E42-801D-0253E1EAFC21}">
+  <ds:schemaRefs>
+    <ds:schemaRef ds:uri="http://schemas.microsoft.com/sharepoint/v3/contenttype/forms"/>
+  </ds:schemaRefs>
+</ds:datastoreItem>
+</file>
+
+<file path=customXml/itemProps3.xml><?xml version="1.0" encoding="utf-8"?>
+<ds:datastoreItem xmlns:ds="http://schemas.openxmlformats.org/officeDocument/2006/customXml" ds:itemID="{99919F73-B6C2-4A43-95E2-833EC48925FE}">
+  <ds:schemaRefs>
+    <ds:schemaRef ds:uri="http://schemas.microsoft.com/office/2006/metadata/properties"/>
+    <ds:schemaRef ds:uri="http://schemas.microsoft.com/office/infopath/2007/PartnerControls"/>
+    <ds:schemaRef ds:uri="71af3243-3dd4-4a8d-8c0d-dd76da1f02a5"/>
+  </ds:schemaRefs>
+</ds:datastoreItem>
 </file>
</xml_diff>